<commit_message>
nonshared aggregation = composition
</commit_message>
<xml_diff>
--- a/Lewis_engineering/4a - OO Design v2.pptx
+++ b/Lewis_engineering/4a - OO Design v2.pptx
@@ -2129,6 +2129,34 @@
               </a:rPr>
               <a:t>Shared aggregation – many parts can be associated with Whole. Part is part of Whole. </a:t>
             </a:r>
+          </a:p>
+          <a:p>
+            <a:pPr eaLnBrk="1" hangingPunct="1"/>
+            <a:r>
+              <a:rPr lang="en-HK" sz="1400" b="0" i="1" u="none" strike="noStrike">
+                <a:solidFill>
+                  <a:srgbClr val="161616"/>
+                </a:solidFill>
+                <a:effectLst/>
+                <a:latin typeface="IBM Plex Sans" panose="020B0503050203000203" pitchFamily="34" charset="0"/>
+              </a:rPr>
+              <a:t>Composition</a:t>
+            </a:r>
+            <a:r>
+              <a:rPr lang="en-HK" sz="1400" b="0" i="0" u="none" strike="noStrike">
+                <a:solidFill>
+                  <a:srgbClr val="161616"/>
+                </a:solidFill>
+                <a:effectLst/>
+                <a:latin typeface="IBM Plex Sans" panose="020B0503050203000203" pitchFamily="34" charset="0"/>
+              </a:rPr>
+              <a:t> is an even stronger form of "non‑shared" aggregation,</a:t>
+            </a:r>
+            <a:endParaRPr lang="en-US" sz="1000" dirty="0">
+              <a:latin typeface="ZapfHumnst BT" pitchFamily="34" charset="0"/>
+              <a:ea typeface="ＭＳ Ｐゴシック" charset="-128"/>
+              <a:cs typeface="ＭＳ Ｐゴシック" charset="-128"/>
+            </a:endParaRPr>
           </a:p>
         </p:txBody>
       </p:sp>
@@ -43246,6 +43274,15 @@
 </file>
 
 <file path=customXml/item1.xml><?xml version="1.0" encoding="utf-8"?>
+<?mso-contentType ?>
+<FormTemplates xmlns="http://schemas.microsoft.com/sharepoint/v3/contenttype/forms">
+  <Display>DocumentLibraryForm</Display>
+  <Edit>DocumentLibraryForm</Edit>
+  <New>DocumentLibraryForm</New>
+</FormTemplates>
+</file>
+
+<file path=customXml/item2.xml><?xml version="1.0" encoding="utf-8"?>
 <ct:contentTypeSchema xmlns:ct="http://schemas.microsoft.com/office/2006/metadata/contentType" xmlns:ma="http://schemas.microsoft.com/office/2006/metadata/properties/metaAttributes" ct:_="" ma:_="" ma:contentTypeName="Document" ma:contentTypeID="0x0101001C92A8A8F031AD4A909BA7A7C456847C" ma:contentTypeVersion="7" ma:contentTypeDescription="Create a new document." ma:contentTypeScope="" ma:versionID="024d5e1985270072f3389235f7dcbb5a">
   <xsd:schema xmlns:xsd="http://www.w3.org/2001/XMLSchema" xmlns:xs="http://www.w3.org/2001/XMLSchema" xmlns:p="http://schemas.microsoft.com/office/2006/metadata/properties" xmlns:ns2="0c9eb513-a068-4d7d-8530-8babfedca41b" targetNamespace="http://schemas.microsoft.com/office/2006/metadata/properties" ma:root="true" ma:fieldsID="dd74bb662c32d1cca5f21a1fd024486b" ns2:_="">
     <xsd:import namespace="0c9eb513-a068-4d7d-8530-8babfedca41b"/>
@@ -43407,22 +43444,21 @@
 </ct:contentTypeSchema>
 </file>
 
-<file path=customXml/item2.xml><?xml version="1.0" encoding="utf-8"?>
+<file path=customXml/item3.xml><?xml version="1.0" encoding="utf-8"?>
 <p:properties xmlns:p="http://schemas.microsoft.com/office/2006/metadata/properties" xmlns:xsi="http://www.w3.org/2001/XMLSchema-instance" xmlns:pc="http://schemas.microsoft.com/office/infopath/2007/PartnerControls">
   <documentManagement/>
 </p:properties>
 </file>
 
-<file path=customXml/item3.xml><?xml version="1.0" encoding="utf-8"?>
-<?mso-contentType ?>
-<FormTemplates xmlns="http://schemas.microsoft.com/sharepoint/v3/contenttype/forms">
-  <Display>DocumentLibraryForm</Display>
-  <Edit>DocumentLibraryForm</Edit>
-  <New>DocumentLibraryForm</New>
-</FormTemplates>
+<file path=customXml/itemProps1.xml><?xml version="1.0" encoding="utf-8"?>
+<ds:datastoreItem xmlns:ds="http://schemas.openxmlformats.org/officeDocument/2006/customXml" ds:itemID="{2E54FBF9-7D3B-41C5-AE94-3EC6D8FB422B}">
+  <ds:schemaRefs>
+    <ds:schemaRef ds:uri="http://schemas.microsoft.com/sharepoint/v3/contenttype/forms"/>
+  </ds:schemaRefs>
+</ds:datastoreItem>
 </file>
 
-<file path=customXml/itemProps1.xml><?xml version="1.0" encoding="utf-8"?>
+<file path=customXml/itemProps2.xml><?xml version="1.0" encoding="utf-8"?>
 <ds:datastoreItem xmlns:ds="http://schemas.openxmlformats.org/officeDocument/2006/customXml" ds:itemID="{B376CF36-A9BA-40C3-A8BB-674D3A5D35F7}">
   <ds:schemaRefs>
     <ds:schemaRef ds:uri="http://schemas.microsoft.com/office/2006/metadata/contentType"/>
@@ -43440,7 +43476,7 @@
 </ds:datastoreItem>
 </file>
 
-<file path=customXml/itemProps2.xml><?xml version="1.0" encoding="utf-8"?>
+<file path=customXml/itemProps3.xml><?xml version="1.0" encoding="utf-8"?>
 <ds:datastoreItem xmlns:ds="http://schemas.openxmlformats.org/officeDocument/2006/customXml" ds:itemID="{DD2A1253-7223-4C47-A6EA-5469F68DEBE9}">
   <ds:schemaRefs>
     <ds:schemaRef ds:uri="http://purl.org/dc/terms/"/>
@@ -43454,12 +43490,4 @@
     <ds:schemaRef ds:uri="http://schemas.openxmlformats.org/package/2006/metadata/core-properties"/>
   </ds:schemaRefs>
 </ds:datastoreItem>
-</file>
-
-<file path=customXml/itemProps3.xml><?xml version="1.0" encoding="utf-8"?>
-<ds:datastoreItem xmlns:ds="http://schemas.openxmlformats.org/officeDocument/2006/customXml" ds:itemID="{2E54FBF9-7D3B-41C5-AE94-3EC6D8FB422B}">
-  <ds:schemaRefs>
-    <ds:schemaRef ds:uri="http://schemas.microsoft.com/sharepoint/v3/contenttype/forms"/>
-  </ds:schemaRefs>
-</ds:datastoreItem>
 </file>
</xml_diff>